<commit_message>
add michin-ai architecture png
</commit_message>
<xml_diff>
--- a/ppts/architectures.pptx
+++ b/ppts/architectures.pptx
@@ -6,6 +6,7 @@
   </p:sldMasterIdLst>
   <p:sldIdLst>
     <p:sldId id="256" r:id="rId2"/>
+    <p:sldId id="257" r:id="rId3"/>
   </p:sldIdLst>
   <p:sldSz cx="12192000" cy="6858000"/>
   <p:notesSz cx="6858000" cy="9144000"/>
@@ -108,6 +109,11 @@
     <p:ext uri="{EFAFB233-063F-42B5-8137-9DF3F51BA10A}">
       <p15:sldGuideLst xmlns:p15="http://schemas.microsoft.com/office/powerpoint/2012/main">
         <p15:guide id="1" pos="4044" userDrawn="1">
+          <p15:clr>
+            <a:srgbClr val="A4A3A4"/>
+          </p15:clr>
+        </p15:guide>
+        <p15:guide id="2" orient="horz" pos="2160">
           <p15:clr>
             <a:srgbClr val="A4A3A4"/>
           </p15:clr>
@@ -4037,8 +4043,8 @@
         </p:nvSpPr>
         <p:spPr>
           <a:xfrm>
-            <a:off x="1690908" y="2898183"/>
-            <a:ext cx="2380342" cy="646331"/>
+            <a:off x="1065265" y="2655361"/>
+            <a:ext cx="3099755" cy="830997"/>
           </a:xfrm>
           <a:prstGeom prst="rect">
             <a:avLst/>
@@ -4052,19 +4058,19 @@
           <a:lstStyle/>
           <a:p>
             <a:r>
-              <a:rPr lang="en-US" altLang="ko-KR" dirty="0">
+              <a:rPr lang="en-US" altLang="ko-KR" sz="2400" dirty="0">
                 <a:latin typeface="Bahnschrift SemiBold SemiConden" panose="020B0502040204020203" pitchFamily="34" charset="0"/>
               </a:rPr>
               <a:t>UDP</a:t>
             </a:r>
             <a:r>
-              <a:rPr lang="ko-KR" altLang="en-US" dirty="0">
+              <a:rPr lang="ko-KR" altLang="en-US" sz="2400" dirty="0">
                 <a:latin typeface="Bahnschrift SemiBold SemiConden" panose="020B0502040204020203" pitchFamily="34" charset="0"/>
               </a:rPr>
               <a:t> </a:t>
             </a:r>
             <a:r>
-              <a:rPr lang="en-US" altLang="ko-KR" dirty="0">
+              <a:rPr lang="en-US" altLang="ko-KR" sz="2400" dirty="0">
                 <a:latin typeface="Bahnschrift SemiBold SemiConden" panose="020B0502040204020203" pitchFamily="34" charset="0"/>
               </a:rPr>
               <a:t>Communication</a:t>
@@ -4072,12 +4078,12 @@
           </a:p>
           <a:p>
             <a:r>
-              <a:rPr lang="en-US" altLang="ko-KR" dirty="0">
+              <a:rPr lang="en-US" altLang="ko-KR" sz="2400" dirty="0">
                 <a:latin typeface="Bahnschrift SemiBold SemiConden" panose="020B0502040204020203" pitchFamily="34" charset="0"/>
               </a:rPr>
               <a:t>(Ethernet)</a:t>
             </a:r>
-            <a:endParaRPr lang="ko-KR" altLang="en-US" dirty="0">
+            <a:endParaRPr lang="ko-KR" altLang="en-US" sz="2400" dirty="0">
               <a:latin typeface="Bahnschrift SemiBold SemiConden" panose="020B0502040204020203" pitchFamily="34" charset="0"/>
             </a:endParaRPr>
           </a:p>
@@ -4308,8 +4314,8 @@
         </p:nvSpPr>
         <p:spPr>
           <a:xfrm>
-            <a:off x="6030002" y="652719"/>
-            <a:ext cx="2380342" cy="369332"/>
+            <a:off x="5949792" y="588551"/>
+            <a:ext cx="2380342" cy="461665"/>
           </a:xfrm>
           <a:prstGeom prst="rect">
             <a:avLst/>
@@ -4323,12 +4329,12 @@
           <a:lstStyle/>
           <a:p>
             <a:r>
-              <a:rPr lang="en-US" altLang="ko-KR" dirty="0">
+              <a:rPr lang="en-US" altLang="ko-KR" sz="2400" dirty="0">
                 <a:latin typeface="Bahnschrift SemiBold SemiConden" panose="020B0502040204020203" pitchFamily="34" charset="0"/>
               </a:rPr>
               <a:t>Ethernet</a:t>
             </a:r>
-            <a:endParaRPr lang="ko-KR" altLang="en-US" dirty="0">
+            <a:endParaRPr lang="ko-KR" altLang="en-US" sz="2400" dirty="0">
               <a:latin typeface="Bahnschrift SemiBold SemiConden" panose="020B0502040204020203" pitchFamily="34" charset="0"/>
             </a:endParaRPr>
           </a:p>
@@ -4336,10 +4342,136 @@
       </p:sp>
       <p:sp>
         <p:nvSpPr>
-          <p:cNvPr id="62" name="화살표: 왼쪽 61">
-            <a:extLst>
-              <a:ext uri="{FF2B5EF4-FFF2-40B4-BE49-F238E27FC236}">
-                <a16:creationId xmlns:a16="http://schemas.microsoft.com/office/drawing/2014/main" id="{ADC60BAC-C75A-4092-A2AC-7CD36142DA1E}"/>
+          <p:cNvPr id="63" name="TextBox 62">
+            <a:extLst>
+              <a:ext uri="{FF2B5EF4-FFF2-40B4-BE49-F238E27FC236}">
+                <a16:creationId xmlns:a16="http://schemas.microsoft.com/office/drawing/2014/main" id="{68D414C7-654F-455D-B480-9990E56E88CA}"/>
+              </a:ext>
+            </a:extLst>
+          </p:cNvPr>
+          <p:cNvSpPr txBox="1"/>
+          <p:nvPr/>
+        </p:nvSpPr>
+        <p:spPr>
+          <a:xfrm>
+            <a:off x="5898787" y="4343388"/>
+            <a:ext cx="2380342" cy="461665"/>
+          </a:xfrm>
+          <a:prstGeom prst="rect">
+            <a:avLst/>
+          </a:prstGeom>
+          <a:noFill/>
+        </p:spPr>
+        <p:txBody>
+          <a:bodyPr wrap="square" rtlCol="0">
+            <a:spAutoFit/>
+          </a:bodyPr>
+          <a:lstStyle/>
+          <a:p>
+            <a:r>
+              <a:rPr lang="en-US" altLang="ko-KR" sz="2400" dirty="0">
+                <a:latin typeface="Bahnschrift SemiBold SemiConden" panose="020B0502040204020203" pitchFamily="34" charset="0"/>
+              </a:rPr>
+              <a:t>TCP Socket</a:t>
+            </a:r>
+            <a:endParaRPr lang="ko-KR" altLang="en-US" sz="2400" dirty="0">
+              <a:latin typeface="Bahnschrift SemiBold SemiConden" panose="020B0502040204020203" pitchFamily="34" charset="0"/>
+            </a:endParaRPr>
+          </a:p>
+        </p:txBody>
+      </p:sp>
+      <p:pic>
+        <p:nvPicPr>
+          <p:cNvPr id="64" name="Picture 6" descr="Dot Icon of Glyph style - Available in SVG, PNG, EPS, AI &amp; Icon fonts">
+            <a:extLst>
+              <a:ext uri="{FF2B5EF4-FFF2-40B4-BE49-F238E27FC236}">
+                <a16:creationId xmlns:a16="http://schemas.microsoft.com/office/drawing/2014/main" id="{48604686-5877-4430-B4B2-74E072A67F81}"/>
+              </a:ext>
+            </a:extLst>
+          </p:cNvPr>
+          <p:cNvPicPr>
+            <a:picLocks noChangeAspect="1" noChangeArrowheads="1"/>
+          </p:cNvPicPr>
+          <p:nvPr/>
+        </p:nvPicPr>
+        <p:blipFill rotWithShape="1">
+          <a:blip r:embed="rId8">
+            <a:duotone>
+              <a:schemeClr val="accent3">
+                <a:shade val="45000"/>
+                <a:satMod val="135000"/>
+              </a:schemeClr>
+              <a:prstClr val="white"/>
+            </a:duotone>
+            <a:extLst>
+              <a:ext uri="{28A0092B-C50C-407E-A947-70E740481C1C}">
+                <a14:useLocalDpi xmlns:a14="http://schemas.microsoft.com/office/drawing/2010/main" val="0"/>
+              </a:ext>
+            </a:extLst>
+          </a:blip>
+          <a:srcRect l="34404" t="34814" r="34403" b="34814"/>
+          <a:stretch/>
+        </p:blipFill>
+        <p:spPr bwMode="auto">
+          <a:xfrm>
+            <a:off x="6399312" y="1358974"/>
+            <a:ext cx="153208" cy="149176"/>
+          </a:xfrm>
+          <a:prstGeom prst="rect">
+            <a:avLst/>
+          </a:prstGeom>
+          <a:noFill/>
+        </p:spPr>
+      </p:pic>
+      <p:pic>
+        <p:nvPicPr>
+          <p:cNvPr id="65" name="Picture 6" descr="Dot Icon of Glyph style - Available in SVG, PNG, EPS, AI &amp; Icon fonts">
+            <a:extLst>
+              <a:ext uri="{FF2B5EF4-FFF2-40B4-BE49-F238E27FC236}">
+                <a16:creationId xmlns:a16="http://schemas.microsoft.com/office/drawing/2014/main" id="{BCF9CBE7-AB6B-439D-8AD6-F3EFD4018886}"/>
+              </a:ext>
+            </a:extLst>
+          </p:cNvPr>
+          <p:cNvPicPr>
+            <a:picLocks noChangeAspect="1" noChangeArrowheads="1"/>
+          </p:cNvPicPr>
+          <p:nvPr/>
+        </p:nvPicPr>
+        <p:blipFill rotWithShape="1">
+          <a:blip r:embed="rId8">
+            <a:duotone>
+              <a:schemeClr val="accent3">
+                <a:shade val="45000"/>
+                <a:satMod val="135000"/>
+              </a:schemeClr>
+              <a:prstClr val="white"/>
+            </a:duotone>
+            <a:extLst>
+              <a:ext uri="{28A0092B-C50C-407E-A947-70E740481C1C}">
+                <a14:useLocalDpi xmlns:a14="http://schemas.microsoft.com/office/drawing/2010/main" val="0"/>
+              </a:ext>
+            </a:extLst>
+          </a:blip>
+          <a:srcRect l="34404" t="34814" r="34403" b="34814"/>
+          <a:stretch/>
+        </p:blipFill>
+        <p:spPr bwMode="auto">
+          <a:xfrm>
+            <a:off x="6399312" y="1489884"/>
+            <a:ext cx="153208" cy="149176"/>
+          </a:xfrm>
+          <a:prstGeom prst="rect">
+            <a:avLst/>
+          </a:prstGeom>
+          <a:noFill/>
+        </p:spPr>
+      </p:pic>
+      <p:sp>
+        <p:nvSpPr>
+          <p:cNvPr id="2" name="화살표: 왼쪽/오른쪽 1">
+            <a:extLst>
+              <a:ext uri="{FF2B5EF4-FFF2-40B4-BE49-F238E27FC236}">
+                <a16:creationId xmlns:a16="http://schemas.microsoft.com/office/drawing/2014/main" id="{B6C38CAE-3597-4F5D-8C33-1A5B5B98755A}"/>
               </a:ext>
             </a:extLst>
           </p:cNvPr>
@@ -4348,15 +4480,15 @@
         </p:nvSpPr>
         <p:spPr>
           <a:xfrm>
-            <a:off x="5210225" y="4703547"/>
-            <a:ext cx="2684590" cy="285409"/>
-          </a:xfrm>
-          <a:prstGeom prst="leftArrow">
+            <a:off x="5207946" y="4692746"/>
+            <a:ext cx="2716006" cy="304310"/>
+          </a:xfrm>
+          <a:prstGeom prst="leftRightArrow">
             <a:avLst/>
           </a:prstGeom>
           <a:solidFill>
-            <a:schemeClr val="accent3">
-              <a:lumMod val="75000"/>
+            <a:schemeClr val="bg2">
+              <a:lumMod val="50000"/>
             </a:schemeClr>
           </a:solidFill>
           <a:ln>
@@ -4390,52 +4522,78 @@
           </a:p>
         </p:txBody>
       </p:sp>
-      <p:sp>
-        <p:nvSpPr>
-          <p:cNvPr id="63" name="TextBox 62">
-            <a:extLst>
-              <a:ext uri="{FF2B5EF4-FFF2-40B4-BE49-F238E27FC236}">
-                <a16:creationId xmlns:a16="http://schemas.microsoft.com/office/drawing/2014/main" id="{68D414C7-654F-455D-B480-9990E56E88CA}"/>
-              </a:ext>
-            </a:extLst>
-          </p:cNvPr>
-          <p:cNvSpPr txBox="1"/>
+    </p:spTree>
+    <p:extLst>
+      <p:ext uri="{BB962C8B-B14F-4D97-AF65-F5344CB8AC3E}">
+        <p14:creationId xmlns:p14="http://schemas.microsoft.com/office/powerpoint/2010/main" val="704051949"/>
+      </p:ext>
+    </p:extLst>
+  </p:cSld>
+  <p:clrMapOvr>
+    <a:masterClrMapping/>
+  </p:clrMapOvr>
+</p:sld>
+</file>
+
+<file path=ppt/slides/slide2.xml><?xml version="1.0" encoding="utf-8"?>
+<p:sld xmlns:a="http://schemas.openxmlformats.org/drawingml/2006/main" xmlns:r="http://schemas.openxmlformats.org/officeDocument/2006/relationships" xmlns:p="http://schemas.openxmlformats.org/presentationml/2006/main">
+  <p:cSld>
+    <p:spTree>
+      <p:nvGrpSpPr>
+        <p:cNvPr id="1" name=""/>
+        <p:cNvGrpSpPr/>
+        <p:nvPr/>
+      </p:nvGrpSpPr>
+      <p:grpSpPr>
+        <a:xfrm>
+          <a:off x="0" y="0"/>
+          <a:ext cx="0" cy="0"/>
+          <a:chOff x="0" y="0"/>
+          <a:chExt cx="0" cy="0"/>
+        </a:xfrm>
+      </p:grpSpPr>
+      <p:pic>
+        <p:nvPicPr>
+          <p:cNvPr id="5" name="그림 4">
+            <a:extLst>
+              <a:ext uri="{FF2B5EF4-FFF2-40B4-BE49-F238E27FC236}">
+                <a16:creationId xmlns:a16="http://schemas.microsoft.com/office/drawing/2014/main" id="{BF478B3B-B50D-49DA-879F-DF3EC18A2119}"/>
+              </a:ext>
+            </a:extLst>
+          </p:cNvPr>
+          <p:cNvPicPr>
+            <a:picLocks noChangeAspect="1"/>
+          </p:cNvPicPr>
           <p:nvPr/>
-        </p:nvSpPr>
+        </p:nvPicPr>
+        <p:blipFill>
+          <a:blip r:embed="rId2">
+            <a:extLst>
+              <a:ext uri="{28A0092B-C50C-407E-A947-70E740481C1C}">
+                <a14:useLocalDpi xmlns:a14="http://schemas.microsoft.com/office/drawing/2010/main" val="0"/>
+              </a:ext>
+            </a:extLst>
+          </a:blip>
+          <a:stretch>
+            <a:fillRect/>
+          </a:stretch>
+        </p:blipFill>
         <p:spPr>
           <a:xfrm>
-            <a:off x="5914829" y="4391514"/>
-            <a:ext cx="2380342" cy="369332"/>
+            <a:off x="9156157" y="4397922"/>
+            <a:ext cx="1719221" cy="1719221"/>
           </a:xfrm>
           <a:prstGeom prst="rect">
             <a:avLst/>
           </a:prstGeom>
-          <a:noFill/>
-        </p:spPr>
-        <p:txBody>
-          <a:bodyPr wrap="square" rtlCol="0">
-            <a:spAutoFit/>
-          </a:bodyPr>
-          <a:lstStyle/>
-          <a:p>
-            <a:r>
-              <a:rPr lang="en-US" altLang="ko-KR" dirty="0">
-                <a:latin typeface="Bahnschrift SemiBold SemiConden" panose="020B0502040204020203" pitchFamily="34" charset="0"/>
-              </a:rPr>
-              <a:t>TCP Socket</a:t>
-            </a:r>
-            <a:endParaRPr lang="ko-KR" altLang="en-US" dirty="0">
-              <a:latin typeface="Bahnschrift SemiBold SemiConden" panose="020B0502040204020203" pitchFamily="34" charset="0"/>
-            </a:endParaRPr>
-          </a:p>
-        </p:txBody>
-      </p:sp>
+        </p:spPr>
+      </p:pic>
       <p:pic>
         <p:nvPicPr>
-          <p:cNvPr id="64" name="Picture 6" descr="Dot Icon of Glyph style - Available in SVG, PNG, EPS, AI &amp; Icon fonts">
-            <a:extLst>
-              <a:ext uri="{FF2B5EF4-FFF2-40B4-BE49-F238E27FC236}">
-                <a16:creationId xmlns:a16="http://schemas.microsoft.com/office/drawing/2014/main" id="{48604686-5877-4430-B4B2-74E072A67F81}"/>
+          <p:cNvPr id="1026" name="Picture 2" descr="LanguageTool (@languagetoolorg) | Twitter">
+            <a:extLst>
+              <a:ext uri="{FF2B5EF4-FFF2-40B4-BE49-F238E27FC236}">
+                <a16:creationId xmlns:a16="http://schemas.microsoft.com/office/drawing/2014/main" id="{2C7B6C54-2E96-44EE-AA01-2D95657B7E35}"/>
               </a:ext>
             </a:extLst>
           </p:cNvPr>
@@ -4444,41 +4602,45 @@
           </p:cNvPicPr>
           <p:nvPr/>
         </p:nvPicPr>
-        <p:blipFill rotWithShape="1">
-          <a:blip r:embed="rId8">
-            <a:duotone>
-              <a:schemeClr val="accent3">
-                <a:shade val="45000"/>
-                <a:satMod val="135000"/>
-              </a:schemeClr>
-              <a:prstClr val="white"/>
-            </a:duotone>
+        <p:blipFill>
+          <a:blip r:embed="rId3">
             <a:extLst>
               <a:ext uri="{28A0092B-C50C-407E-A947-70E740481C1C}">
                 <a14:useLocalDpi xmlns:a14="http://schemas.microsoft.com/office/drawing/2010/main" val="0"/>
               </a:ext>
             </a:extLst>
           </a:blip>
-          <a:srcRect l="34404" t="34814" r="34403" b="34814"/>
-          <a:stretch/>
+          <a:srcRect/>
+          <a:stretch>
+            <a:fillRect/>
+          </a:stretch>
         </p:blipFill>
         <p:spPr bwMode="auto">
           <a:xfrm>
-            <a:off x="6399312" y="1358974"/>
-            <a:ext cx="153208" cy="149176"/>
+            <a:off x="1485437" y="572039"/>
+            <a:ext cx="1719221" cy="1719221"/>
           </a:xfrm>
           <a:prstGeom prst="rect">
             <a:avLst/>
           </a:prstGeom>
           <a:noFill/>
+          <a:extLst>
+            <a:ext uri="{909E8E84-426E-40DD-AFC4-6F175D3DCCD1}">
+              <a14:hiddenFill xmlns:a14="http://schemas.microsoft.com/office/drawing/2010/main">
+                <a:solidFill>
+                  <a:srgbClr val="FFFFFF"/>
+                </a:solidFill>
+              </a14:hiddenFill>
+            </a:ext>
+          </a:extLst>
         </p:spPr>
       </p:pic>
       <p:pic>
         <p:nvPicPr>
-          <p:cNvPr id="65" name="Picture 6" descr="Dot Icon of Glyph style - Available in SVG, PNG, EPS, AI &amp; Icon fonts">
-            <a:extLst>
-              <a:ext uri="{FF2B5EF4-FFF2-40B4-BE49-F238E27FC236}">
-                <a16:creationId xmlns:a16="http://schemas.microsoft.com/office/drawing/2014/main" id="{BCF9CBE7-AB6B-439D-8AD6-F3EFD4018886}"/>
+          <p:cNvPr id="1028" name="Picture 4" descr="MongoDB Icon - Free Download, PNG and Vector">
+            <a:extLst>
+              <a:ext uri="{FF2B5EF4-FFF2-40B4-BE49-F238E27FC236}">
+                <a16:creationId xmlns:a16="http://schemas.microsoft.com/office/drawing/2014/main" id="{32402ACA-AED2-496E-AFEF-0FFF0E91DB5E}"/>
               </a:ext>
             </a:extLst>
           </p:cNvPr>
@@ -4487,39 +4649,1156 @@
           </p:cNvPicPr>
           <p:nvPr/>
         </p:nvPicPr>
-        <p:blipFill rotWithShape="1">
-          <a:blip r:embed="rId8">
-            <a:duotone>
-              <a:schemeClr val="accent3">
-                <a:shade val="45000"/>
-                <a:satMod val="135000"/>
-              </a:schemeClr>
-              <a:prstClr val="white"/>
-            </a:duotone>
+        <p:blipFill>
+          <a:blip r:embed="rId4">
             <a:extLst>
               <a:ext uri="{28A0092B-C50C-407E-A947-70E740481C1C}">
                 <a14:useLocalDpi xmlns:a14="http://schemas.microsoft.com/office/drawing/2010/main" val="0"/>
               </a:ext>
             </a:extLst>
           </a:blip>
-          <a:srcRect l="34404" t="34814" r="34403" b="34814"/>
-          <a:stretch/>
+          <a:srcRect/>
+          <a:stretch>
+            <a:fillRect/>
+          </a:stretch>
         </p:blipFill>
         <p:spPr bwMode="auto">
           <a:xfrm>
-            <a:off x="6399312" y="1489884"/>
-            <a:ext cx="153208" cy="149176"/>
+            <a:off x="1480437" y="4397921"/>
+            <a:ext cx="1719222" cy="1719222"/>
           </a:xfrm>
           <a:prstGeom prst="rect">
             <a:avLst/>
           </a:prstGeom>
           <a:noFill/>
+          <a:extLst>
+            <a:ext uri="{909E8E84-426E-40DD-AFC4-6F175D3DCCD1}">
+              <a14:hiddenFill xmlns:a14="http://schemas.microsoft.com/office/drawing/2010/main">
+                <a:solidFill>
+                  <a:srgbClr val="FFFFFF"/>
+                </a:solidFill>
+              </a14:hiddenFill>
+            </a:ext>
+          </a:extLst>
         </p:spPr>
       </p:pic>
+      <p:pic>
+        <p:nvPicPr>
+          <p:cNvPr id="1030" name="Picture 6" descr="ParlAI">
+            <a:extLst>
+              <a:ext uri="{FF2B5EF4-FFF2-40B4-BE49-F238E27FC236}">
+                <a16:creationId xmlns:a16="http://schemas.microsoft.com/office/drawing/2014/main" id="{03B1E2F3-C576-4B03-9BBA-E59C928ACA5B}"/>
+              </a:ext>
+            </a:extLst>
+          </p:cNvPr>
+          <p:cNvPicPr>
+            <a:picLocks noChangeAspect="1" noChangeArrowheads="1"/>
+          </p:cNvPicPr>
+          <p:nvPr/>
+        </p:nvPicPr>
+        <p:blipFill>
+          <a:blip r:embed="rId5">
+            <a:extLst>
+              <a:ext uri="{28A0092B-C50C-407E-A947-70E740481C1C}">
+                <a14:useLocalDpi xmlns:a14="http://schemas.microsoft.com/office/drawing/2010/main" val="0"/>
+              </a:ext>
+            </a:extLst>
+          </a:blip>
+          <a:srcRect/>
+          <a:stretch>
+            <a:fillRect/>
+          </a:stretch>
+        </p:blipFill>
+        <p:spPr bwMode="auto">
+          <a:xfrm>
+            <a:off x="5544198" y="4397921"/>
+            <a:ext cx="1719221" cy="1719221"/>
+          </a:xfrm>
+          <a:prstGeom prst="rect">
+            <a:avLst/>
+          </a:prstGeom>
+          <a:noFill/>
+          <a:extLst>
+            <a:ext uri="{909E8E84-426E-40DD-AFC4-6F175D3DCCD1}">
+              <a14:hiddenFill xmlns:a14="http://schemas.microsoft.com/office/drawing/2010/main">
+                <a:solidFill>
+                  <a:srgbClr val="FFFFFF"/>
+                </a:solidFill>
+              </a14:hiddenFill>
+            </a:ext>
+          </a:extLst>
+        </p:spPr>
+      </p:pic>
+      <p:pic>
+        <p:nvPicPr>
+          <p:cNvPr id="1034" name="Picture 10" descr="Spring Framework-icon | Brands SN - SZ">
+            <a:extLst>
+              <a:ext uri="{FF2B5EF4-FFF2-40B4-BE49-F238E27FC236}">
+                <a16:creationId xmlns:a16="http://schemas.microsoft.com/office/drawing/2014/main" id="{0DAD001C-FB1C-488C-A80A-A3C7A50438B3}"/>
+              </a:ext>
+            </a:extLst>
+          </p:cNvPr>
+          <p:cNvPicPr>
+            <a:picLocks noChangeAspect="1" noChangeArrowheads="1"/>
+          </p:cNvPicPr>
+          <p:nvPr/>
+        </p:nvPicPr>
+        <p:blipFill>
+          <a:blip r:embed="rId6">
+            <a:extLst>
+              <a:ext uri="{28A0092B-C50C-407E-A947-70E740481C1C}">
+                <a14:useLocalDpi xmlns:a14="http://schemas.microsoft.com/office/drawing/2010/main" val="0"/>
+              </a:ext>
+            </a:extLst>
+          </a:blip>
+          <a:srcRect/>
+          <a:stretch>
+            <a:fillRect/>
+          </a:stretch>
+        </p:blipFill>
+        <p:spPr bwMode="auto">
+          <a:xfrm>
+            <a:off x="5719762" y="740856"/>
+            <a:ext cx="1400175" cy="1381589"/>
+          </a:xfrm>
+          <a:prstGeom prst="rect">
+            <a:avLst/>
+          </a:prstGeom>
+          <a:noFill/>
+          <a:extLst>
+            <a:ext uri="{909E8E84-426E-40DD-AFC4-6F175D3DCCD1}">
+              <a14:hiddenFill xmlns:a14="http://schemas.microsoft.com/office/drawing/2010/main">
+                <a:solidFill>
+                  <a:srgbClr val="FFFFFF"/>
+                </a:solidFill>
+              </a14:hiddenFill>
+            </a:ext>
+          </a:extLst>
+        </p:spPr>
+      </p:pic>
+      <p:pic>
+        <p:nvPicPr>
+          <p:cNvPr id="1038" name="Picture 14" descr="카카오톡 로고(.ai) 일러스트 다운로드">
+            <a:extLst>
+              <a:ext uri="{FF2B5EF4-FFF2-40B4-BE49-F238E27FC236}">
+                <a16:creationId xmlns:a16="http://schemas.microsoft.com/office/drawing/2014/main" id="{8E6487CA-D2F7-40A9-B708-3A30F3E2C9FD}"/>
+              </a:ext>
+            </a:extLst>
+          </p:cNvPr>
+          <p:cNvPicPr>
+            <a:picLocks noChangeAspect="1" noChangeArrowheads="1"/>
+          </p:cNvPicPr>
+          <p:nvPr/>
+        </p:nvPicPr>
+        <p:blipFill>
+          <a:blip r:embed="rId7">
+            <a:extLst>
+              <a:ext uri="{28A0092B-C50C-407E-A947-70E740481C1C}">
+                <a14:useLocalDpi xmlns:a14="http://schemas.microsoft.com/office/drawing/2010/main" val="0"/>
+              </a:ext>
+            </a:extLst>
+          </a:blip>
+          <a:srcRect/>
+          <a:stretch>
+            <a:fillRect/>
+          </a:stretch>
+        </p:blipFill>
+        <p:spPr bwMode="auto">
+          <a:xfrm>
+            <a:off x="9324974" y="740857"/>
+            <a:ext cx="1381589" cy="1381589"/>
+          </a:xfrm>
+          <a:prstGeom prst="rect">
+            <a:avLst/>
+          </a:prstGeom>
+          <a:noFill/>
+          <a:extLst>
+            <a:ext uri="{909E8E84-426E-40DD-AFC4-6F175D3DCCD1}">
+              <a14:hiddenFill xmlns:a14="http://schemas.microsoft.com/office/drawing/2010/main">
+                <a:solidFill>
+                  <a:srgbClr val="FFFFFF"/>
+                </a:solidFill>
+              </a14:hiddenFill>
+            </a:ext>
+          </a:extLst>
+        </p:spPr>
+      </p:pic>
+      <p:sp>
+        <p:nvSpPr>
+          <p:cNvPr id="7" name="화살표: 위쪽 6">
+            <a:extLst>
+              <a:ext uri="{FF2B5EF4-FFF2-40B4-BE49-F238E27FC236}">
+                <a16:creationId xmlns:a16="http://schemas.microsoft.com/office/drawing/2014/main" id="{177C8DE0-73C3-471B-8450-0338E9697DAB}"/>
+              </a:ext>
+            </a:extLst>
+          </p:cNvPr>
+          <p:cNvSpPr/>
+          <p:nvPr/>
+        </p:nvSpPr>
+        <p:spPr>
+          <a:xfrm>
+            <a:off x="10240357" y="2460078"/>
+            <a:ext cx="282279" cy="1590929"/>
+          </a:xfrm>
+          <a:prstGeom prst="upArrow">
+            <a:avLst/>
+          </a:prstGeom>
+          <a:solidFill>
+            <a:schemeClr val="accent4"/>
+          </a:solidFill>
+          <a:ln>
+            <a:solidFill>
+              <a:schemeClr val="bg1"/>
+            </a:solidFill>
+          </a:ln>
+        </p:spPr>
+        <p:style>
+          <a:lnRef idx="2">
+            <a:schemeClr val="accent1">
+              <a:shade val="50000"/>
+            </a:schemeClr>
+          </a:lnRef>
+          <a:fillRef idx="1">
+            <a:schemeClr val="accent1"/>
+          </a:fillRef>
+          <a:effectRef idx="0">
+            <a:schemeClr val="accent1"/>
+          </a:effectRef>
+          <a:fontRef idx="minor">
+            <a:schemeClr val="lt1"/>
+          </a:fontRef>
+        </p:style>
+        <p:txBody>
+          <a:bodyPr rtlCol="0" anchor="ctr"/>
+          <a:lstStyle/>
+          <a:p>
+            <a:pPr algn="ctr"/>
+            <a:endParaRPr lang="ko-KR" altLang="en-US"/>
+          </a:p>
+        </p:txBody>
+      </p:sp>
+      <p:sp>
+        <p:nvSpPr>
+          <p:cNvPr id="14" name="화살표: 위쪽 13">
+            <a:extLst>
+              <a:ext uri="{FF2B5EF4-FFF2-40B4-BE49-F238E27FC236}">
+                <a16:creationId xmlns:a16="http://schemas.microsoft.com/office/drawing/2014/main" id="{93F9D665-2964-44F7-B2E0-54B619CA0B83}"/>
+              </a:ext>
+            </a:extLst>
+          </p:cNvPr>
+          <p:cNvSpPr/>
+          <p:nvPr/>
+        </p:nvSpPr>
+        <p:spPr>
+          <a:xfrm rot="16200000">
+            <a:off x="8081316" y="286372"/>
+            <a:ext cx="282279" cy="1590929"/>
+          </a:xfrm>
+          <a:prstGeom prst="upArrow">
+            <a:avLst/>
+          </a:prstGeom>
+          <a:solidFill>
+            <a:schemeClr val="accent4"/>
+          </a:solidFill>
+          <a:ln>
+            <a:solidFill>
+              <a:schemeClr val="bg1"/>
+            </a:solidFill>
+          </a:ln>
+        </p:spPr>
+        <p:style>
+          <a:lnRef idx="2">
+            <a:schemeClr val="accent1">
+              <a:shade val="50000"/>
+            </a:schemeClr>
+          </a:lnRef>
+          <a:fillRef idx="1">
+            <a:schemeClr val="accent1"/>
+          </a:fillRef>
+          <a:effectRef idx="0">
+            <a:schemeClr val="accent1"/>
+          </a:effectRef>
+          <a:fontRef idx="minor">
+            <a:schemeClr val="lt1"/>
+          </a:fontRef>
+        </p:style>
+        <p:txBody>
+          <a:bodyPr rtlCol="0" anchor="ctr"/>
+          <a:lstStyle/>
+          <a:p>
+            <a:pPr algn="ctr"/>
+            <a:endParaRPr lang="ko-KR" altLang="en-US"/>
+          </a:p>
+        </p:txBody>
+      </p:sp>
+      <p:sp>
+        <p:nvSpPr>
+          <p:cNvPr id="8" name="화살표: 위쪽/아래쪽 7">
+            <a:extLst>
+              <a:ext uri="{FF2B5EF4-FFF2-40B4-BE49-F238E27FC236}">
+                <a16:creationId xmlns:a16="http://schemas.microsoft.com/office/drawing/2014/main" id="{B1E47534-1B0E-4F31-9D44-527AC1E8242C}"/>
+              </a:ext>
+            </a:extLst>
+          </p:cNvPr>
+          <p:cNvSpPr/>
+          <p:nvPr/>
+        </p:nvSpPr>
+        <p:spPr>
+          <a:xfrm rot="2700000">
+            <a:off x="4272301" y="1962512"/>
+            <a:ext cx="294035" cy="2932976"/>
+          </a:xfrm>
+          <a:prstGeom prst="upDownArrow">
+            <a:avLst/>
+          </a:prstGeom>
+          <a:solidFill>
+            <a:schemeClr val="accent5"/>
+          </a:solidFill>
+          <a:ln>
+            <a:solidFill>
+              <a:schemeClr val="bg1"/>
+            </a:solidFill>
+          </a:ln>
+        </p:spPr>
+        <p:style>
+          <a:lnRef idx="2">
+            <a:schemeClr val="accent1">
+              <a:shade val="50000"/>
+            </a:schemeClr>
+          </a:lnRef>
+          <a:fillRef idx="1">
+            <a:schemeClr val="accent1"/>
+          </a:fillRef>
+          <a:effectRef idx="0">
+            <a:schemeClr val="accent1"/>
+          </a:effectRef>
+          <a:fontRef idx="minor">
+            <a:schemeClr val="lt1"/>
+          </a:fontRef>
+        </p:style>
+        <p:txBody>
+          <a:bodyPr rtlCol="0" anchor="ctr"/>
+          <a:lstStyle/>
+          <a:p>
+            <a:pPr algn="ctr"/>
+            <a:endParaRPr lang="ko-KR" altLang="en-US"/>
+          </a:p>
+        </p:txBody>
+      </p:sp>
+      <p:sp>
+        <p:nvSpPr>
+          <p:cNvPr id="16" name="화살표: 위쪽/아래쪽 15">
+            <a:extLst>
+              <a:ext uri="{FF2B5EF4-FFF2-40B4-BE49-F238E27FC236}">
+                <a16:creationId xmlns:a16="http://schemas.microsoft.com/office/drawing/2014/main" id="{F1CBA126-5305-4E48-A617-BDD811AD872A}"/>
+              </a:ext>
+            </a:extLst>
+          </p:cNvPr>
+          <p:cNvSpPr/>
+          <p:nvPr/>
+        </p:nvSpPr>
+        <p:spPr>
+          <a:xfrm rot="5400000">
+            <a:off x="4124274" y="254622"/>
+            <a:ext cx="292247" cy="2374846"/>
+          </a:xfrm>
+          <a:prstGeom prst="upDownArrow">
+            <a:avLst/>
+          </a:prstGeom>
+          <a:solidFill>
+            <a:schemeClr val="accent5"/>
+          </a:solidFill>
+          <a:ln>
+            <a:solidFill>
+              <a:schemeClr val="bg1"/>
+            </a:solidFill>
+          </a:ln>
+        </p:spPr>
+        <p:style>
+          <a:lnRef idx="2">
+            <a:schemeClr val="accent1">
+              <a:shade val="50000"/>
+            </a:schemeClr>
+          </a:lnRef>
+          <a:fillRef idx="1">
+            <a:schemeClr val="accent1"/>
+          </a:fillRef>
+          <a:effectRef idx="0">
+            <a:schemeClr val="accent1"/>
+          </a:effectRef>
+          <a:fontRef idx="minor">
+            <a:schemeClr val="lt1"/>
+          </a:fontRef>
+        </p:style>
+        <p:txBody>
+          <a:bodyPr rtlCol="0" anchor="ctr"/>
+          <a:lstStyle/>
+          <a:p>
+            <a:pPr algn="ctr"/>
+            <a:endParaRPr lang="ko-KR" altLang="en-US"/>
+          </a:p>
+        </p:txBody>
+      </p:sp>
+      <p:sp>
+        <p:nvSpPr>
+          <p:cNvPr id="17" name="화살표: 위쪽 16">
+            <a:extLst>
+              <a:ext uri="{FF2B5EF4-FFF2-40B4-BE49-F238E27FC236}">
+                <a16:creationId xmlns:a16="http://schemas.microsoft.com/office/drawing/2014/main" id="{FEB055CB-D0FD-41CA-83C9-C8EC3FF5506F}"/>
+              </a:ext>
+            </a:extLst>
+          </p:cNvPr>
+          <p:cNvSpPr/>
+          <p:nvPr/>
+        </p:nvSpPr>
+        <p:spPr>
+          <a:xfrm rot="10800000">
+            <a:off x="6664052" y="2460078"/>
+            <a:ext cx="282278" cy="1789524"/>
+          </a:xfrm>
+          <a:prstGeom prst="upArrow">
+            <a:avLst/>
+          </a:prstGeom>
+          <a:solidFill>
+            <a:schemeClr val="accent5"/>
+          </a:solidFill>
+          <a:ln>
+            <a:solidFill>
+              <a:schemeClr val="bg1"/>
+            </a:solidFill>
+          </a:ln>
+        </p:spPr>
+        <p:style>
+          <a:lnRef idx="2">
+            <a:schemeClr val="accent1">
+              <a:shade val="50000"/>
+            </a:schemeClr>
+          </a:lnRef>
+          <a:fillRef idx="1">
+            <a:schemeClr val="accent1"/>
+          </a:fillRef>
+          <a:effectRef idx="0">
+            <a:schemeClr val="accent1"/>
+          </a:effectRef>
+          <a:fontRef idx="minor">
+            <a:schemeClr val="lt1"/>
+          </a:fontRef>
+        </p:style>
+        <p:txBody>
+          <a:bodyPr rtlCol="0" anchor="ctr"/>
+          <a:lstStyle/>
+          <a:p>
+            <a:pPr algn="ctr"/>
+            <a:endParaRPr lang="ko-KR" altLang="en-US"/>
+          </a:p>
+        </p:txBody>
+      </p:sp>
+      <p:sp>
+        <p:nvSpPr>
+          <p:cNvPr id="19" name="화살표: 위쪽 18">
+            <a:extLst>
+              <a:ext uri="{FF2B5EF4-FFF2-40B4-BE49-F238E27FC236}">
+                <a16:creationId xmlns:a16="http://schemas.microsoft.com/office/drawing/2014/main" id="{B5D09B45-BA7C-4B23-B65E-2DD345FC1D31}"/>
+              </a:ext>
+            </a:extLst>
+          </p:cNvPr>
+          <p:cNvSpPr/>
+          <p:nvPr/>
+        </p:nvSpPr>
+        <p:spPr>
+          <a:xfrm>
+            <a:off x="5906936" y="2460078"/>
+            <a:ext cx="282278" cy="1789524"/>
+          </a:xfrm>
+          <a:prstGeom prst="upArrow">
+            <a:avLst/>
+          </a:prstGeom>
+          <a:solidFill>
+            <a:schemeClr val="accent5"/>
+          </a:solidFill>
+          <a:ln>
+            <a:solidFill>
+              <a:schemeClr val="bg1"/>
+            </a:solidFill>
+          </a:ln>
+        </p:spPr>
+        <p:style>
+          <a:lnRef idx="2">
+            <a:schemeClr val="accent1">
+              <a:shade val="50000"/>
+            </a:schemeClr>
+          </a:lnRef>
+          <a:fillRef idx="1">
+            <a:schemeClr val="accent1"/>
+          </a:fillRef>
+          <a:effectRef idx="0">
+            <a:schemeClr val="accent1"/>
+          </a:effectRef>
+          <a:fontRef idx="minor">
+            <a:schemeClr val="lt1"/>
+          </a:fontRef>
+        </p:style>
+        <p:txBody>
+          <a:bodyPr rtlCol="0" anchor="ctr"/>
+          <a:lstStyle/>
+          <a:p>
+            <a:pPr algn="ctr"/>
+            <a:endParaRPr lang="ko-KR" altLang="en-US"/>
+          </a:p>
+        </p:txBody>
+      </p:sp>
+      <p:sp>
+        <p:nvSpPr>
+          <p:cNvPr id="20" name="TextBox 19">
+            <a:extLst>
+              <a:ext uri="{FF2B5EF4-FFF2-40B4-BE49-F238E27FC236}">
+                <a16:creationId xmlns:a16="http://schemas.microsoft.com/office/drawing/2014/main" id="{028ACE22-7019-4AC0-BF1D-F93205C4F4C5}"/>
+              </a:ext>
+            </a:extLst>
+          </p:cNvPr>
+          <p:cNvSpPr txBox="1"/>
+          <p:nvPr/>
+        </p:nvSpPr>
+        <p:spPr>
+          <a:xfrm>
+            <a:off x="9529220" y="5957151"/>
+            <a:ext cx="2380342" cy="400110"/>
+          </a:xfrm>
+          <a:prstGeom prst="rect">
+            <a:avLst/>
+          </a:prstGeom>
+          <a:noFill/>
+        </p:spPr>
+        <p:txBody>
+          <a:bodyPr wrap="square" rtlCol="0">
+            <a:spAutoFit/>
+          </a:bodyPr>
+          <a:lstStyle/>
+          <a:p>
+            <a:r>
+              <a:rPr lang="en-US" altLang="ko-KR" sz="2000" dirty="0" err="1">
+                <a:latin typeface="Bahnschrift SemiBold SemiConden" panose="020B0502040204020203" pitchFamily="34" charset="0"/>
+              </a:rPr>
+              <a:t>Michin</a:t>
+            </a:r>
+            <a:r>
+              <a:rPr lang="en-US" altLang="ko-KR" sz="2000" dirty="0">
+                <a:latin typeface="Bahnschrift SemiBold SemiConden" panose="020B0502040204020203" pitchFamily="34" charset="0"/>
+              </a:rPr>
+              <a:t> AI</a:t>
+            </a:r>
+            <a:endParaRPr lang="ko-KR" altLang="en-US" sz="2000" dirty="0">
+              <a:latin typeface="Bahnschrift SemiBold SemiConden" panose="020B0502040204020203" pitchFamily="34" charset="0"/>
+            </a:endParaRPr>
+          </a:p>
+        </p:txBody>
+      </p:sp>
+      <p:sp>
+        <p:nvSpPr>
+          <p:cNvPr id="21" name="TextBox 20">
+            <a:extLst>
+              <a:ext uri="{FF2B5EF4-FFF2-40B4-BE49-F238E27FC236}">
+                <a16:creationId xmlns:a16="http://schemas.microsoft.com/office/drawing/2014/main" id="{8D680225-93D3-4EA0-9E49-2B99FC268EBC}"/>
+              </a:ext>
+            </a:extLst>
+          </p:cNvPr>
+          <p:cNvSpPr txBox="1"/>
+          <p:nvPr/>
+        </p:nvSpPr>
+        <p:spPr>
+          <a:xfrm>
+            <a:off x="6035272" y="5957151"/>
+            <a:ext cx="2380342" cy="400110"/>
+          </a:xfrm>
+          <a:prstGeom prst="rect">
+            <a:avLst/>
+          </a:prstGeom>
+          <a:noFill/>
+        </p:spPr>
+        <p:txBody>
+          <a:bodyPr wrap="square" rtlCol="0">
+            <a:spAutoFit/>
+          </a:bodyPr>
+          <a:lstStyle/>
+          <a:p>
+            <a:r>
+              <a:rPr lang="en-US" altLang="ko-KR" sz="2000" dirty="0" err="1">
+                <a:latin typeface="Bahnschrift SemiBold SemiConden" panose="020B0502040204020203" pitchFamily="34" charset="0"/>
+              </a:rPr>
+              <a:t>ParlAI</a:t>
+            </a:r>
+            <a:endParaRPr lang="ko-KR" altLang="en-US" sz="2000" dirty="0">
+              <a:latin typeface="Bahnschrift SemiBold SemiConden" panose="020B0502040204020203" pitchFamily="34" charset="0"/>
+            </a:endParaRPr>
+          </a:p>
+        </p:txBody>
+      </p:sp>
+      <p:sp>
+        <p:nvSpPr>
+          <p:cNvPr id="22" name="TextBox 21">
+            <a:extLst>
+              <a:ext uri="{FF2B5EF4-FFF2-40B4-BE49-F238E27FC236}">
+                <a16:creationId xmlns:a16="http://schemas.microsoft.com/office/drawing/2014/main" id="{579C35A4-DD76-46A9-9284-9EF6C6C8DE1A}"/>
+              </a:ext>
+            </a:extLst>
+          </p:cNvPr>
+          <p:cNvSpPr txBox="1"/>
+          <p:nvPr/>
+        </p:nvSpPr>
+        <p:spPr>
+          <a:xfrm>
+            <a:off x="1668878" y="1914688"/>
+            <a:ext cx="2380342" cy="400110"/>
+          </a:xfrm>
+          <a:prstGeom prst="rect">
+            <a:avLst/>
+          </a:prstGeom>
+          <a:noFill/>
+        </p:spPr>
+        <p:txBody>
+          <a:bodyPr wrap="square" rtlCol="0">
+            <a:spAutoFit/>
+          </a:bodyPr>
+          <a:lstStyle/>
+          <a:p>
+            <a:r>
+              <a:rPr lang="en-US" altLang="ko-KR" sz="2000" dirty="0" err="1">
+                <a:latin typeface="Bahnschrift SemiBold SemiConden" panose="020B0502040204020203" pitchFamily="34" charset="0"/>
+              </a:rPr>
+              <a:t>LanguageTool</a:t>
+            </a:r>
+            <a:endParaRPr lang="ko-KR" altLang="en-US" sz="2000" dirty="0">
+              <a:latin typeface="Bahnschrift SemiBold SemiConden" panose="020B0502040204020203" pitchFamily="34" charset="0"/>
+            </a:endParaRPr>
+          </a:p>
+        </p:txBody>
+      </p:sp>
+      <p:sp>
+        <p:nvSpPr>
+          <p:cNvPr id="23" name="TextBox 22">
+            <a:extLst>
+              <a:ext uri="{FF2B5EF4-FFF2-40B4-BE49-F238E27FC236}">
+                <a16:creationId xmlns:a16="http://schemas.microsoft.com/office/drawing/2014/main" id="{5CD8E614-8B8B-4EAC-9514-EA2DCEBF27A4}"/>
+              </a:ext>
+            </a:extLst>
+          </p:cNvPr>
+          <p:cNvSpPr txBox="1"/>
+          <p:nvPr/>
+        </p:nvSpPr>
+        <p:spPr>
+          <a:xfrm>
+            <a:off x="1845340" y="5957151"/>
+            <a:ext cx="2380342" cy="400110"/>
+          </a:xfrm>
+          <a:prstGeom prst="rect">
+            <a:avLst/>
+          </a:prstGeom>
+          <a:noFill/>
+        </p:spPr>
+        <p:txBody>
+          <a:bodyPr wrap="square" rtlCol="0">
+            <a:spAutoFit/>
+          </a:bodyPr>
+          <a:lstStyle/>
+          <a:p>
+            <a:r>
+              <a:rPr lang="en-US" altLang="ko-KR" sz="2000" dirty="0">
+                <a:latin typeface="Bahnschrift SemiBold SemiConden" panose="020B0502040204020203" pitchFamily="34" charset="0"/>
+              </a:rPr>
+              <a:t>MongoDB</a:t>
+            </a:r>
+            <a:endParaRPr lang="ko-KR" altLang="en-US" sz="2000" dirty="0">
+              <a:latin typeface="Bahnschrift SemiBold SemiConden" panose="020B0502040204020203" pitchFamily="34" charset="0"/>
+            </a:endParaRPr>
+          </a:p>
+        </p:txBody>
+      </p:sp>
+      <p:sp>
+        <p:nvSpPr>
+          <p:cNvPr id="26" name="화살표: 위쪽 25">
+            <a:extLst>
+              <a:ext uri="{FF2B5EF4-FFF2-40B4-BE49-F238E27FC236}">
+                <a16:creationId xmlns:a16="http://schemas.microsoft.com/office/drawing/2014/main" id="{DC1E9149-6A33-43C5-9C0F-9C39CAD10D1A}"/>
+              </a:ext>
+            </a:extLst>
+          </p:cNvPr>
+          <p:cNvSpPr/>
+          <p:nvPr/>
+        </p:nvSpPr>
+        <p:spPr>
+          <a:xfrm rot="5400000">
+            <a:off x="8081316" y="930355"/>
+            <a:ext cx="282279" cy="1590929"/>
+          </a:xfrm>
+          <a:prstGeom prst="upArrow">
+            <a:avLst/>
+          </a:prstGeom>
+          <a:solidFill>
+            <a:schemeClr val="accent4"/>
+          </a:solidFill>
+          <a:ln>
+            <a:solidFill>
+              <a:schemeClr val="bg1"/>
+            </a:solidFill>
+          </a:ln>
+        </p:spPr>
+        <p:style>
+          <a:lnRef idx="2">
+            <a:schemeClr val="accent1">
+              <a:shade val="50000"/>
+            </a:schemeClr>
+          </a:lnRef>
+          <a:fillRef idx="1">
+            <a:schemeClr val="accent1"/>
+          </a:fillRef>
+          <a:effectRef idx="0">
+            <a:schemeClr val="accent1"/>
+          </a:effectRef>
+          <a:fontRef idx="minor">
+            <a:schemeClr val="lt1"/>
+          </a:fontRef>
+        </p:style>
+        <p:txBody>
+          <a:bodyPr rtlCol="0" anchor="ctr"/>
+          <a:lstStyle/>
+          <a:p>
+            <a:pPr algn="ctr"/>
+            <a:endParaRPr lang="ko-KR" altLang="en-US"/>
+          </a:p>
+        </p:txBody>
+      </p:sp>
+      <p:sp>
+        <p:nvSpPr>
+          <p:cNvPr id="27" name="화살표: 위쪽 26">
+            <a:extLst>
+              <a:ext uri="{FF2B5EF4-FFF2-40B4-BE49-F238E27FC236}">
+                <a16:creationId xmlns:a16="http://schemas.microsoft.com/office/drawing/2014/main" id="{66AA5BF5-820B-4FCC-9A91-EF8CEEA4D976}"/>
+              </a:ext>
+            </a:extLst>
+          </p:cNvPr>
+          <p:cNvSpPr/>
+          <p:nvPr/>
+        </p:nvSpPr>
+        <p:spPr>
+          <a:xfrm rot="10800000">
+            <a:off x="9529220" y="2460077"/>
+            <a:ext cx="282279" cy="1590929"/>
+          </a:xfrm>
+          <a:prstGeom prst="upArrow">
+            <a:avLst/>
+          </a:prstGeom>
+          <a:solidFill>
+            <a:schemeClr val="accent4"/>
+          </a:solidFill>
+          <a:ln>
+            <a:solidFill>
+              <a:schemeClr val="bg1"/>
+            </a:solidFill>
+          </a:ln>
+        </p:spPr>
+        <p:style>
+          <a:lnRef idx="2">
+            <a:schemeClr val="accent1">
+              <a:shade val="50000"/>
+            </a:schemeClr>
+          </a:lnRef>
+          <a:fillRef idx="1">
+            <a:schemeClr val="accent1"/>
+          </a:fillRef>
+          <a:effectRef idx="0">
+            <a:schemeClr val="accent1"/>
+          </a:effectRef>
+          <a:fontRef idx="minor">
+            <a:schemeClr val="lt1"/>
+          </a:fontRef>
+        </p:style>
+        <p:txBody>
+          <a:bodyPr rtlCol="0" anchor="ctr"/>
+          <a:lstStyle/>
+          <a:p>
+            <a:pPr algn="ctr"/>
+            <a:endParaRPr lang="ko-KR" altLang="en-US"/>
+          </a:p>
+        </p:txBody>
+      </p:sp>
+      <p:sp>
+        <p:nvSpPr>
+          <p:cNvPr id="28" name="TextBox 27">
+            <a:extLst>
+              <a:ext uri="{FF2B5EF4-FFF2-40B4-BE49-F238E27FC236}">
+                <a16:creationId xmlns:a16="http://schemas.microsoft.com/office/drawing/2014/main" id="{10D7185D-CF5A-4504-81B6-D00EA0A3A36B}"/>
+              </a:ext>
+            </a:extLst>
+          </p:cNvPr>
+          <p:cNvSpPr txBox="1"/>
+          <p:nvPr/>
+        </p:nvSpPr>
+        <p:spPr>
+          <a:xfrm>
+            <a:off x="3808872" y="915139"/>
+            <a:ext cx="2380342" cy="461665"/>
+          </a:xfrm>
+          <a:prstGeom prst="rect">
+            <a:avLst/>
+          </a:prstGeom>
+          <a:noFill/>
+        </p:spPr>
+        <p:txBody>
+          <a:bodyPr wrap="square" rtlCol="0">
+            <a:spAutoFit/>
+          </a:bodyPr>
+          <a:lstStyle/>
+          <a:p>
+            <a:r>
+              <a:rPr lang="en-US" altLang="ko-KR" sz="2400" dirty="0">
+                <a:latin typeface="Bahnschrift SemiBold SemiConden" panose="020B0502040204020203" pitchFamily="34" charset="0"/>
+              </a:rPr>
+              <a:t>Async</a:t>
+            </a:r>
+            <a:endParaRPr lang="ko-KR" altLang="en-US" sz="2400" dirty="0">
+              <a:latin typeface="Bahnschrift SemiBold SemiConden" panose="020B0502040204020203" pitchFamily="34" charset="0"/>
+            </a:endParaRPr>
+          </a:p>
+        </p:txBody>
+      </p:sp>
+      <p:sp>
+        <p:nvSpPr>
+          <p:cNvPr id="29" name="TextBox 28">
+            <a:extLst>
+              <a:ext uri="{FF2B5EF4-FFF2-40B4-BE49-F238E27FC236}">
+                <a16:creationId xmlns:a16="http://schemas.microsoft.com/office/drawing/2014/main" id="{CB43A297-DE86-4D23-9C9B-A99E8F1C2C31}"/>
+              </a:ext>
+            </a:extLst>
+          </p:cNvPr>
+          <p:cNvSpPr txBox="1"/>
+          <p:nvPr/>
+        </p:nvSpPr>
+        <p:spPr>
+          <a:xfrm>
+            <a:off x="3590246" y="2974728"/>
+            <a:ext cx="2380342" cy="461665"/>
+          </a:xfrm>
+          <a:prstGeom prst="rect">
+            <a:avLst/>
+          </a:prstGeom>
+          <a:noFill/>
+        </p:spPr>
+        <p:txBody>
+          <a:bodyPr wrap="square" rtlCol="0">
+            <a:spAutoFit/>
+          </a:bodyPr>
+          <a:lstStyle/>
+          <a:p>
+            <a:r>
+              <a:rPr lang="en-US" altLang="ko-KR" sz="2400" dirty="0">
+                <a:latin typeface="Bahnschrift SemiBold SemiConden" panose="020B0502040204020203" pitchFamily="34" charset="0"/>
+              </a:rPr>
+              <a:t>Async</a:t>
+            </a:r>
+            <a:endParaRPr lang="ko-KR" altLang="en-US" sz="2400" dirty="0">
+              <a:latin typeface="Bahnschrift SemiBold SemiConden" panose="020B0502040204020203" pitchFamily="34" charset="0"/>
+            </a:endParaRPr>
+          </a:p>
+        </p:txBody>
+      </p:sp>
+      <p:sp>
+        <p:nvSpPr>
+          <p:cNvPr id="30" name="TextBox 29">
+            <a:extLst>
+              <a:ext uri="{FF2B5EF4-FFF2-40B4-BE49-F238E27FC236}">
+                <a16:creationId xmlns:a16="http://schemas.microsoft.com/office/drawing/2014/main" id="{7EE95247-E9FD-46BF-854D-51C04837AFFB}"/>
+              </a:ext>
+            </a:extLst>
+          </p:cNvPr>
+          <p:cNvSpPr txBox="1"/>
+          <p:nvPr/>
+        </p:nvSpPr>
+        <p:spPr>
+          <a:xfrm>
+            <a:off x="6363312" y="3631264"/>
+            <a:ext cx="2380342" cy="461665"/>
+          </a:xfrm>
+          <a:prstGeom prst="rect">
+            <a:avLst/>
+          </a:prstGeom>
+          <a:noFill/>
+        </p:spPr>
+        <p:txBody>
+          <a:bodyPr wrap="square" rtlCol="0">
+            <a:spAutoFit/>
+          </a:bodyPr>
+          <a:lstStyle/>
+          <a:p>
+            <a:r>
+              <a:rPr lang="en-US" altLang="ko-KR" sz="2400" dirty="0">
+                <a:latin typeface="Bahnschrift SemiBold SemiConden" panose="020B0502040204020203" pitchFamily="34" charset="0"/>
+              </a:rPr>
+              <a:t>Web Socket</a:t>
+            </a:r>
+            <a:endParaRPr lang="ko-KR" altLang="en-US" sz="2400" dirty="0">
+              <a:latin typeface="Bahnschrift SemiBold SemiConden" panose="020B0502040204020203" pitchFamily="34" charset="0"/>
+            </a:endParaRPr>
+          </a:p>
+        </p:txBody>
+      </p:sp>
+      <p:sp>
+        <p:nvSpPr>
+          <p:cNvPr id="31" name="TextBox 30">
+            <a:extLst>
+              <a:ext uri="{FF2B5EF4-FFF2-40B4-BE49-F238E27FC236}">
+                <a16:creationId xmlns:a16="http://schemas.microsoft.com/office/drawing/2014/main" id="{85F2F265-C55F-4F84-9A2C-A98C85CE31C9}"/>
+              </a:ext>
+            </a:extLst>
+          </p:cNvPr>
+          <p:cNvSpPr txBox="1"/>
+          <p:nvPr/>
+        </p:nvSpPr>
+        <p:spPr>
+          <a:xfrm>
+            <a:off x="5329733" y="2721346"/>
+            <a:ext cx="2380342" cy="830997"/>
+          </a:xfrm>
+          <a:prstGeom prst="rect">
+            <a:avLst/>
+          </a:prstGeom>
+          <a:noFill/>
+        </p:spPr>
+        <p:txBody>
+          <a:bodyPr wrap="square" rtlCol="0">
+            <a:spAutoFit/>
+          </a:bodyPr>
+          <a:lstStyle/>
+          <a:p>
+            <a:r>
+              <a:rPr lang="en-US" altLang="ko-KR" sz="2400" dirty="0">
+                <a:latin typeface="Bahnschrift SemiBold SemiConden" panose="020B0502040204020203" pitchFamily="34" charset="0"/>
+              </a:rPr>
+              <a:t>Message</a:t>
+            </a:r>
+          </a:p>
+          <a:p>
+            <a:r>
+              <a:rPr lang="en-US" altLang="ko-KR" sz="2400" dirty="0">
+                <a:latin typeface="Bahnschrift SemiBold SemiConden" panose="020B0502040204020203" pitchFamily="34" charset="0"/>
+              </a:rPr>
+              <a:t>Polling</a:t>
+            </a:r>
+            <a:endParaRPr lang="ko-KR" altLang="en-US" sz="2400" dirty="0">
+              <a:latin typeface="Bahnschrift SemiBold SemiConden" panose="020B0502040204020203" pitchFamily="34" charset="0"/>
+            </a:endParaRPr>
+          </a:p>
+        </p:txBody>
+      </p:sp>
+      <p:sp>
+        <p:nvSpPr>
+          <p:cNvPr id="32" name="TextBox 31">
+            <a:extLst>
+              <a:ext uri="{FF2B5EF4-FFF2-40B4-BE49-F238E27FC236}">
+                <a16:creationId xmlns:a16="http://schemas.microsoft.com/office/drawing/2014/main" id="{0D8B15E0-0AD8-4A36-A803-E1F6D98D8F1F}"/>
+              </a:ext>
+            </a:extLst>
+          </p:cNvPr>
+          <p:cNvSpPr txBox="1"/>
+          <p:nvPr/>
+        </p:nvSpPr>
+        <p:spPr>
+          <a:xfrm>
+            <a:off x="7827749" y="592990"/>
+            <a:ext cx="2380342" cy="461665"/>
+          </a:xfrm>
+          <a:prstGeom prst="rect">
+            <a:avLst/>
+          </a:prstGeom>
+          <a:noFill/>
+        </p:spPr>
+        <p:txBody>
+          <a:bodyPr wrap="square" rtlCol="0">
+            <a:spAutoFit/>
+          </a:bodyPr>
+          <a:lstStyle/>
+          <a:p>
+            <a:r>
+              <a:rPr lang="en-US" altLang="ko-KR" sz="2400" dirty="0">
+                <a:latin typeface="Bahnschrift SemiBold SemiConden" panose="020B0502040204020203" pitchFamily="34" charset="0"/>
+              </a:rPr>
+              <a:t>POST</a:t>
+            </a:r>
+            <a:endParaRPr lang="ko-KR" altLang="en-US" sz="2400" dirty="0">
+              <a:latin typeface="Bahnschrift SemiBold SemiConden" panose="020B0502040204020203" pitchFamily="34" charset="0"/>
+            </a:endParaRPr>
+          </a:p>
+        </p:txBody>
+      </p:sp>
+      <p:sp>
+        <p:nvSpPr>
+          <p:cNvPr id="33" name="TextBox 32">
+            <a:extLst>
+              <a:ext uri="{FF2B5EF4-FFF2-40B4-BE49-F238E27FC236}">
+                <a16:creationId xmlns:a16="http://schemas.microsoft.com/office/drawing/2014/main" id="{C2B8908D-E81E-43DE-BF15-505254BF8D4E}"/>
+              </a:ext>
+            </a:extLst>
+          </p:cNvPr>
+          <p:cNvSpPr txBox="1"/>
+          <p:nvPr/>
+        </p:nvSpPr>
+        <p:spPr>
+          <a:xfrm>
+            <a:off x="7578315" y="1225344"/>
+            <a:ext cx="2380342" cy="461665"/>
+          </a:xfrm>
+          <a:prstGeom prst="rect">
+            <a:avLst/>
+          </a:prstGeom>
+          <a:noFill/>
+        </p:spPr>
+        <p:txBody>
+          <a:bodyPr wrap="square" rtlCol="0">
+            <a:spAutoFit/>
+          </a:bodyPr>
+          <a:lstStyle/>
+          <a:p>
+            <a:r>
+              <a:rPr lang="en-US" altLang="ko-KR" sz="2400" dirty="0">
+                <a:latin typeface="Bahnschrift SemiBold SemiConden" panose="020B0502040204020203" pitchFamily="34" charset="0"/>
+              </a:rPr>
+              <a:t>Response</a:t>
+            </a:r>
+            <a:endParaRPr lang="ko-KR" altLang="en-US" sz="2400" dirty="0">
+              <a:latin typeface="Bahnschrift SemiBold SemiConden" panose="020B0502040204020203" pitchFamily="34" charset="0"/>
+            </a:endParaRPr>
+          </a:p>
+        </p:txBody>
+      </p:sp>
+      <p:sp>
+        <p:nvSpPr>
+          <p:cNvPr id="9" name="말풍선: 모서리가 둥근 사각형 8">
+            <a:extLst>
+              <a:ext uri="{FF2B5EF4-FFF2-40B4-BE49-F238E27FC236}">
+                <a16:creationId xmlns:a16="http://schemas.microsoft.com/office/drawing/2014/main" id="{206464D8-AFA5-4C46-96D7-E420A7145FF4}"/>
+              </a:ext>
+            </a:extLst>
+          </p:cNvPr>
+          <p:cNvSpPr/>
+          <p:nvPr/>
+        </p:nvSpPr>
+        <p:spPr>
+          <a:xfrm>
+            <a:off x="8606313" y="3135925"/>
+            <a:ext cx="883078" cy="416418"/>
+          </a:xfrm>
+          <a:prstGeom prst="wedgeRoundRectCallout">
+            <a:avLst>
+              <a:gd name="adj1" fmla="val 39115"/>
+              <a:gd name="adj2" fmla="val 85614"/>
+              <a:gd name="adj3" fmla="val 16667"/>
+            </a:avLst>
+          </a:prstGeom>
+          <a:solidFill>
+            <a:schemeClr val="bg2">
+              <a:lumMod val="50000"/>
+            </a:schemeClr>
+          </a:solidFill>
+          <a:ln>
+            <a:solidFill>
+              <a:schemeClr val="bg1"/>
+            </a:solidFill>
+          </a:ln>
+        </p:spPr>
+        <p:style>
+          <a:lnRef idx="2">
+            <a:schemeClr val="accent1">
+              <a:shade val="50000"/>
+            </a:schemeClr>
+          </a:lnRef>
+          <a:fillRef idx="1">
+            <a:schemeClr val="accent1"/>
+          </a:fillRef>
+          <a:effectRef idx="0">
+            <a:schemeClr val="accent1"/>
+          </a:effectRef>
+          <a:fontRef idx="minor">
+            <a:schemeClr val="lt1"/>
+          </a:fontRef>
+        </p:style>
+        <p:txBody>
+          <a:bodyPr rtlCol="0" anchor="ctr"/>
+          <a:lstStyle/>
+          <a:p>
+            <a:pPr algn="ctr"/>
+            <a:r>
+              <a:rPr lang="ko-KR" altLang="en-US" sz="2000" b="1" dirty="0"/>
+              <a:t>대화</a:t>
+            </a:r>
+          </a:p>
+        </p:txBody>
+      </p:sp>
+      <p:sp>
+        <p:nvSpPr>
+          <p:cNvPr id="36" name="말풍선: 모서리가 둥근 사각형 35">
+            <a:extLst>
+              <a:ext uri="{FF2B5EF4-FFF2-40B4-BE49-F238E27FC236}">
+                <a16:creationId xmlns:a16="http://schemas.microsoft.com/office/drawing/2014/main" id="{2C6523B6-CB05-4C97-B99C-F9BEE82417C6}"/>
+              </a:ext>
+            </a:extLst>
+          </p:cNvPr>
+          <p:cNvSpPr/>
+          <p:nvPr/>
+        </p:nvSpPr>
+        <p:spPr>
+          <a:xfrm>
+            <a:off x="10544555" y="3135925"/>
+            <a:ext cx="883078" cy="416418"/>
+          </a:xfrm>
+          <a:prstGeom prst="wedgeRoundRectCallout">
+            <a:avLst>
+              <a:gd name="adj1" fmla="val -42633"/>
+              <a:gd name="adj2" fmla="val 89466"/>
+              <a:gd name="adj3" fmla="val 16667"/>
+            </a:avLst>
+          </a:prstGeom>
+          <a:solidFill>
+            <a:schemeClr val="bg2">
+              <a:lumMod val="50000"/>
+            </a:schemeClr>
+          </a:solidFill>
+          <a:ln>
+            <a:solidFill>
+              <a:schemeClr val="bg1"/>
+            </a:solidFill>
+          </a:ln>
+        </p:spPr>
+        <p:style>
+          <a:lnRef idx="2">
+            <a:schemeClr val="accent1">
+              <a:shade val="50000"/>
+            </a:schemeClr>
+          </a:lnRef>
+          <a:fillRef idx="1">
+            <a:schemeClr val="accent1"/>
+          </a:fillRef>
+          <a:effectRef idx="0">
+            <a:schemeClr val="accent1"/>
+          </a:effectRef>
+          <a:fontRef idx="minor">
+            <a:schemeClr val="lt1"/>
+          </a:fontRef>
+        </p:style>
+        <p:txBody>
+          <a:bodyPr rtlCol="0" anchor="ctr"/>
+          <a:lstStyle/>
+          <a:p>
+            <a:pPr algn="ctr"/>
+            <a:r>
+              <a:rPr lang="ko-KR" altLang="en-US" sz="2000" b="1" dirty="0"/>
+              <a:t>대화</a:t>
+            </a:r>
+          </a:p>
+        </p:txBody>
+      </p:sp>
     </p:spTree>
     <p:extLst>
       <p:ext uri="{BB962C8B-B14F-4D97-AF65-F5344CB8AC3E}">
-        <p14:creationId xmlns:p14="http://schemas.microsoft.com/office/powerpoint/2010/main" val="704051949"/>
+        <p14:creationId xmlns:p14="http://schemas.microsoft.com/office/powerpoint/2010/main" val="2527947129"/>
       </p:ext>
     </p:extLst>
   </p:cSld>

</xml_diff>